<commit_message>
Alteração do slide da aula 001
</commit_message>
<xml_diff>
--- a/Aula 001/Aula 1.pptx
+++ b/Aula 001/Aula 1.pptx
@@ -108,6 +108,11 @@
       </a:defRPr>
     </a:lvl9pPr>
   </p:defaultTextStyle>
+  <p:extLst>
+    <p:ext uri="{EFAFB233-063F-42B5-8137-9DF3F51BA10A}">
+      <p15:sldGuideLst xmlns:p15="http://schemas.microsoft.com/office/powerpoint/2012/main"/>
+    </p:ext>
+  </p:extLst>
 </p:presentation>
 </file>
 
@@ -3344,7 +3349,7 @@
         <p:spPr>
           <a:xfrm>
             <a:off x="1524000" y="3602038"/>
-            <a:ext cx="9144000" cy="430466"/>
+            <a:ext cx="9144000" cy="503618"/>
           </a:xfrm>
         </p:spPr>
         <p:txBody>
@@ -3353,7 +3358,7 @@
           <a:p>
             <a:r>
               <a:rPr lang="pt-BR" dirty="0"/>
-              <a:t>Apresentação do professor</a:t>
+              <a:t>Leonardo Barcelos Marques</a:t>
             </a:r>
           </a:p>
         </p:txBody>
@@ -6596,7 +6601,7 @@
         <p:spPr>
           <a:xfrm>
             <a:off x="838200" y="1825625"/>
-            <a:ext cx="10515600" cy="4351338"/>
+            <a:ext cx="10515600" cy="1685671"/>
           </a:xfrm>
           <a:prstGeom prst="rect">
             <a:avLst/>
@@ -6806,6 +6811,219 @@
               <a:buChar char="•"/>
             </a:pPr>
             <a:endParaRPr lang="pt-BR" dirty="0"/>
+          </a:p>
+        </p:txBody>
+      </p:sp>
+      <p:sp>
+        <p:nvSpPr>
+          <p:cNvPr id="3" name="Espaço Reservado para Conteúdo 2">
+            <a:extLst>
+              <a:ext uri="{FF2B5EF4-FFF2-40B4-BE49-F238E27FC236}">
+                <a16:creationId xmlns:a16="http://schemas.microsoft.com/office/drawing/2014/main" id="{F60DFCF5-5A1E-FFE9-1937-A37F302EE68A}"/>
+              </a:ext>
+            </a:extLst>
+          </p:cNvPr>
+          <p:cNvSpPr txBox="1">
+            <a:spLocks/>
+          </p:cNvSpPr>
+          <p:nvPr/>
+        </p:nvSpPr>
+        <p:spPr>
+          <a:xfrm>
+            <a:off x="838200" y="3523361"/>
+            <a:ext cx="10515600" cy="1685671"/>
+          </a:xfrm>
+          <a:prstGeom prst="rect">
+            <a:avLst/>
+          </a:prstGeom>
+        </p:spPr>
+        <p:txBody>
+          <a:bodyPr vert="horz" lIns="91440" tIns="45720" rIns="91440" bIns="45720" rtlCol="0">
+            <a:normAutofit/>
+          </a:bodyPr>
+          <a:lstStyle>
+            <a:lvl1pPr marL="0" indent="0" algn="ctr" defTabSz="914400" rtl="0" eaLnBrk="1" latinLnBrk="0" hangingPunct="1">
+              <a:lnSpc>
+                <a:spcPct val="90000"/>
+              </a:lnSpc>
+              <a:spcBef>
+                <a:spcPts val="1000"/>
+              </a:spcBef>
+              <a:buFont typeface="Arial" panose="020B0604020202020204" pitchFamily="34" charset="0"/>
+              <a:buNone/>
+              <a:defRPr sz="2400" kern="1200">
+                <a:solidFill>
+                  <a:schemeClr val="tx1"/>
+                </a:solidFill>
+                <a:latin typeface="+mn-lt"/>
+                <a:ea typeface="+mn-ea"/>
+                <a:cs typeface="+mn-cs"/>
+              </a:defRPr>
+            </a:lvl1pPr>
+            <a:lvl2pPr marL="457200" indent="0" algn="ctr" defTabSz="914400" rtl="0" eaLnBrk="1" latinLnBrk="0" hangingPunct="1">
+              <a:lnSpc>
+                <a:spcPct val="90000"/>
+              </a:lnSpc>
+              <a:spcBef>
+                <a:spcPts val="500"/>
+              </a:spcBef>
+              <a:buFont typeface="Arial" panose="020B0604020202020204" pitchFamily="34" charset="0"/>
+              <a:buNone/>
+              <a:defRPr sz="2000" kern="1200">
+                <a:solidFill>
+                  <a:schemeClr val="tx1"/>
+                </a:solidFill>
+                <a:latin typeface="+mn-lt"/>
+                <a:ea typeface="+mn-ea"/>
+                <a:cs typeface="+mn-cs"/>
+              </a:defRPr>
+            </a:lvl2pPr>
+            <a:lvl3pPr marL="914400" indent="0" algn="ctr" defTabSz="914400" rtl="0" eaLnBrk="1" latinLnBrk="0" hangingPunct="1">
+              <a:lnSpc>
+                <a:spcPct val="90000"/>
+              </a:lnSpc>
+              <a:spcBef>
+                <a:spcPts val="500"/>
+              </a:spcBef>
+              <a:buFont typeface="Arial" panose="020B0604020202020204" pitchFamily="34" charset="0"/>
+              <a:buNone/>
+              <a:defRPr sz="1800" kern="1200">
+                <a:solidFill>
+                  <a:schemeClr val="tx1"/>
+                </a:solidFill>
+                <a:latin typeface="+mn-lt"/>
+                <a:ea typeface="+mn-ea"/>
+                <a:cs typeface="+mn-cs"/>
+              </a:defRPr>
+            </a:lvl3pPr>
+            <a:lvl4pPr marL="1371600" indent="0" algn="ctr" defTabSz="914400" rtl="0" eaLnBrk="1" latinLnBrk="0" hangingPunct="1">
+              <a:lnSpc>
+                <a:spcPct val="90000"/>
+              </a:lnSpc>
+              <a:spcBef>
+                <a:spcPts val="500"/>
+              </a:spcBef>
+              <a:buFont typeface="Arial" panose="020B0604020202020204" pitchFamily="34" charset="0"/>
+              <a:buNone/>
+              <a:defRPr sz="1600" kern="1200">
+                <a:solidFill>
+                  <a:schemeClr val="tx1"/>
+                </a:solidFill>
+                <a:latin typeface="+mn-lt"/>
+                <a:ea typeface="+mn-ea"/>
+                <a:cs typeface="+mn-cs"/>
+              </a:defRPr>
+            </a:lvl4pPr>
+            <a:lvl5pPr marL="1828800" indent="0" algn="ctr" defTabSz="914400" rtl="0" eaLnBrk="1" latinLnBrk="0" hangingPunct="1">
+              <a:lnSpc>
+                <a:spcPct val="90000"/>
+              </a:lnSpc>
+              <a:spcBef>
+                <a:spcPts val="500"/>
+              </a:spcBef>
+              <a:buFont typeface="Arial" panose="020B0604020202020204" pitchFamily="34" charset="0"/>
+              <a:buNone/>
+              <a:defRPr sz="1600" kern="1200">
+                <a:solidFill>
+                  <a:schemeClr val="tx1"/>
+                </a:solidFill>
+                <a:latin typeface="+mn-lt"/>
+                <a:ea typeface="+mn-ea"/>
+                <a:cs typeface="+mn-cs"/>
+              </a:defRPr>
+            </a:lvl5pPr>
+            <a:lvl6pPr marL="2286000" indent="0" algn="ctr" defTabSz="914400" rtl="0" eaLnBrk="1" latinLnBrk="0" hangingPunct="1">
+              <a:lnSpc>
+                <a:spcPct val="90000"/>
+              </a:lnSpc>
+              <a:spcBef>
+                <a:spcPts val="500"/>
+              </a:spcBef>
+              <a:buFont typeface="Arial" panose="020B0604020202020204" pitchFamily="34" charset="0"/>
+              <a:buNone/>
+              <a:defRPr sz="1600" kern="1200">
+                <a:solidFill>
+                  <a:schemeClr val="tx1"/>
+                </a:solidFill>
+                <a:latin typeface="+mn-lt"/>
+                <a:ea typeface="+mn-ea"/>
+                <a:cs typeface="+mn-cs"/>
+              </a:defRPr>
+            </a:lvl6pPr>
+            <a:lvl7pPr marL="2743200" indent="0" algn="ctr" defTabSz="914400" rtl="0" eaLnBrk="1" latinLnBrk="0" hangingPunct="1">
+              <a:lnSpc>
+                <a:spcPct val="90000"/>
+              </a:lnSpc>
+              <a:spcBef>
+                <a:spcPts val="500"/>
+              </a:spcBef>
+              <a:buFont typeface="Arial" panose="020B0604020202020204" pitchFamily="34" charset="0"/>
+              <a:buNone/>
+              <a:defRPr sz="1600" kern="1200">
+                <a:solidFill>
+                  <a:schemeClr val="tx1"/>
+                </a:solidFill>
+                <a:latin typeface="+mn-lt"/>
+                <a:ea typeface="+mn-ea"/>
+                <a:cs typeface="+mn-cs"/>
+              </a:defRPr>
+            </a:lvl7pPr>
+            <a:lvl8pPr marL="3200400" indent="0" algn="ctr" defTabSz="914400" rtl="0" eaLnBrk="1" latinLnBrk="0" hangingPunct="1">
+              <a:lnSpc>
+                <a:spcPct val="90000"/>
+              </a:lnSpc>
+              <a:spcBef>
+                <a:spcPts val="500"/>
+              </a:spcBef>
+              <a:buFont typeface="Arial" panose="020B0604020202020204" pitchFamily="34" charset="0"/>
+              <a:buNone/>
+              <a:defRPr sz="1600" kern="1200">
+                <a:solidFill>
+                  <a:schemeClr val="tx1"/>
+                </a:solidFill>
+                <a:latin typeface="+mn-lt"/>
+                <a:ea typeface="+mn-ea"/>
+                <a:cs typeface="+mn-cs"/>
+              </a:defRPr>
+            </a:lvl8pPr>
+            <a:lvl9pPr marL="3657600" indent="0" algn="ctr" defTabSz="914400" rtl="0" eaLnBrk="1" latinLnBrk="0" hangingPunct="1">
+              <a:lnSpc>
+                <a:spcPct val="90000"/>
+              </a:lnSpc>
+              <a:spcBef>
+                <a:spcPts val="500"/>
+              </a:spcBef>
+              <a:buFont typeface="Arial" panose="020B0604020202020204" pitchFamily="34" charset="0"/>
+              <a:buNone/>
+              <a:defRPr sz="1600" kern="1200">
+                <a:solidFill>
+                  <a:schemeClr val="tx1"/>
+                </a:solidFill>
+                <a:latin typeface="+mn-lt"/>
+                <a:ea typeface="+mn-ea"/>
+                <a:cs typeface="+mn-cs"/>
+              </a:defRPr>
+            </a:lvl9pPr>
+          </a:lstStyle>
+          <a:p>
+            <a:pPr marL="342900" indent="-342900" algn="l">
+              <a:buFont typeface="Arial" panose="020B0604020202020204" pitchFamily="34" charset="0"/>
+              <a:buChar char="•"/>
+            </a:pPr>
+            <a:r>
+              <a:rPr lang="pt-BR" dirty="0"/>
+              <a:t>GitHub</a:t>
+            </a:r>
+          </a:p>
+          <a:p>
+            <a:pPr marL="342900" indent="-342900" algn="l">
+              <a:buFont typeface="Arial" panose="020B0604020202020204" pitchFamily="34" charset="0"/>
+              <a:buChar char="•"/>
+            </a:pPr>
+            <a:r>
+              <a:rPr lang="pt-BR" dirty="0"/>
+              <a:t>https://github.com/LBarcelosM/Edge-Blazor-Course.git</a:t>
+            </a:r>
           </a:p>
         </p:txBody>
       </p:sp>

</xml_diff>